<commit_message>
Final version internal presentation
</commit_message>
<xml_diff>
--- a/InternalPresentation_CMAS_AlejandroValverde_19_07.pptx
+++ b/InternalPresentation_CMAS_AlejandroValverde_19_07.pptx
@@ -5,11 +5,15 @@
     <p:sldMasterId id="2147483648" r:id="rId1"/>
   </p:sldMasterIdLst>
   <p:notesMasterIdLst>
-    <p:notesMasterId r:id="rId4"/>
+    <p:notesMasterId r:id="rId8"/>
   </p:notesMasterIdLst>
   <p:sldIdLst>
     <p:sldId id="256" r:id="rId2"/>
-    <p:sldId id="273" r:id="rId3"/>
+    <p:sldId id="278" r:id="rId3"/>
+    <p:sldId id="274" r:id="rId4"/>
+    <p:sldId id="275" r:id="rId5"/>
+    <p:sldId id="277" r:id="rId6"/>
+    <p:sldId id="276" r:id="rId7"/>
   </p:sldIdLst>
   <p:sldSz cx="12187238" cy="6858000"/>
   <p:notesSz cx="6794500" cy="9931400"/>
@@ -110,7 +114,7 @@
   </p:defaultTextStyle>
   <p:extLst>
     <p:ext uri="{EFAFB233-063F-42B5-8137-9DF3F51BA10A}">
-      <p15:sldGuideLst xmlns:p15="http://schemas.microsoft.com/office/powerpoint/2012/main" xmlns="">
+      <p15:sldGuideLst xmlns="" xmlns:p15="http://schemas.microsoft.com/office/powerpoint/2012/main">
         <p15:guide id="1" orient="horz" pos="391">
           <p15:clr>
             <a:srgbClr val="A4A3A4"/>
@@ -254,7 +258,7 @@
           <a:p>
             <a:fld id="{BCDB334D-D17F-49C4-91DD-37BB7E818209}" type="datetimeFigureOut">
               <a:rPr lang="de-CH" smtClean="0"/>
-              <a:t>18.07.2017</a:t>
+              <a:t>19.07.2017</a:t>
             </a:fld>
             <a:endParaRPr lang="de-CH"/>
           </a:p>
@@ -690,6 +694,342 @@
 </p:notes>
 </file>
 
+<file path=ppt/notesSlides/notesSlide3.xml><?xml version="1.0" encoding="utf-8"?>
+<p:notes xmlns:a="http://schemas.openxmlformats.org/drawingml/2006/main" xmlns:r="http://schemas.openxmlformats.org/officeDocument/2006/relationships" xmlns:p="http://schemas.openxmlformats.org/presentationml/2006/main">
+  <p:cSld>
+    <p:spTree>
+      <p:nvGrpSpPr>
+        <p:cNvPr id="1" name=""/>
+        <p:cNvGrpSpPr/>
+        <p:nvPr/>
+      </p:nvGrpSpPr>
+      <p:grpSpPr>
+        <a:xfrm>
+          <a:off x="0" y="0"/>
+          <a:ext cx="0" cy="0"/>
+          <a:chOff x="0" y="0"/>
+          <a:chExt cx="0" cy="0"/>
+        </a:xfrm>
+      </p:grpSpPr>
+      <p:sp>
+        <p:nvSpPr>
+          <p:cNvPr id="2" name="Slide Image Placeholder 1"/>
+          <p:cNvSpPr>
+            <a:spLocks noGrp="1" noRot="1" noChangeAspect="1"/>
+          </p:cNvSpPr>
+          <p:nvPr>
+            <p:ph type="sldImg"/>
+          </p:nvPr>
+        </p:nvSpPr>
+        <p:spPr/>
+      </p:sp>
+      <p:sp>
+        <p:nvSpPr>
+          <p:cNvPr id="3" name="Notes Placeholder 2"/>
+          <p:cNvSpPr>
+            <a:spLocks noGrp="1"/>
+          </p:cNvSpPr>
+          <p:nvPr>
+            <p:ph type="body" idx="1"/>
+          </p:nvPr>
+        </p:nvSpPr>
+        <p:spPr/>
+        <p:txBody>
+          <a:bodyPr/>
+          <a:lstStyle/>
+          <a:p>
+            <a:endParaRPr lang="en-US" dirty="0"/>
+          </a:p>
+        </p:txBody>
+      </p:sp>
+      <p:sp>
+        <p:nvSpPr>
+          <p:cNvPr id="4" name="Slide Number Placeholder 3"/>
+          <p:cNvSpPr>
+            <a:spLocks noGrp="1"/>
+          </p:cNvSpPr>
+          <p:nvPr>
+            <p:ph type="sldNum" sz="quarter" idx="10"/>
+          </p:nvPr>
+        </p:nvSpPr>
+        <p:spPr/>
+        <p:txBody>
+          <a:bodyPr/>
+          <a:lstStyle/>
+          <a:p>
+            <a:fld id="{A51C0C35-A9A2-4EFD-9BAF-1E52E29E03D1}" type="slidenum">
+              <a:rPr lang="de-CH" smtClean="0"/>
+              <a:t>3</a:t>
+            </a:fld>
+            <a:endParaRPr lang="de-CH"/>
+          </a:p>
+        </p:txBody>
+      </p:sp>
+    </p:spTree>
+    <p:extLst>
+      <p:ext uri="{BB962C8B-B14F-4D97-AF65-F5344CB8AC3E}">
+        <p14:creationId xmlns:p14="http://schemas.microsoft.com/office/powerpoint/2010/main" val="1516757331"/>
+      </p:ext>
+    </p:extLst>
+  </p:cSld>
+  <p:clrMapOvr>
+    <a:masterClrMapping/>
+  </p:clrMapOvr>
+</p:notes>
+</file>
+
+<file path=ppt/notesSlides/notesSlide4.xml><?xml version="1.0" encoding="utf-8"?>
+<p:notes xmlns:a="http://schemas.openxmlformats.org/drawingml/2006/main" xmlns:r="http://schemas.openxmlformats.org/officeDocument/2006/relationships" xmlns:p="http://schemas.openxmlformats.org/presentationml/2006/main">
+  <p:cSld>
+    <p:spTree>
+      <p:nvGrpSpPr>
+        <p:cNvPr id="1" name=""/>
+        <p:cNvGrpSpPr/>
+        <p:nvPr/>
+      </p:nvGrpSpPr>
+      <p:grpSpPr>
+        <a:xfrm>
+          <a:off x="0" y="0"/>
+          <a:ext cx="0" cy="0"/>
+          <a:chOff x="0" y="0"/>
+          <a:chExt cx="0" cy="0"/>
+        </a:xfrm>
+      </p:grpSpPr>
+      <p:sp>
+        <p:nvSpPr>
+          <p:cNvPr id="2" name="Slide Image Placeholder 1"/>
+          <p:cNvSpPr>
+            <a:spLocks noGrp="1" noRot="1" noChangeAspect="1"/>
+          </p:cNvSpPr>
+          <p:nvPr>
+            <p:ph type="sldImg"/>
+          </p:nvPr>
+        </p:nvSpPr>
+        <p:spPr/>
+      </p:sp>
+      <p:sp>
+        <p:nvSpPr>
+          <p:cNvPr id="3" name="Notes Placeholder 2"/>
+          <p:cNvSpPr>
+            <a:spLocks noGrp="1"/>
+          </p:cNvSpPr>
+          <p:nvPr>
+            <p:ph type="body" idx="1"/>
+          </p:nvPr>
+        </p:nvSpPr>
+        <p:spPr/>
+        <p:txBody>
+          <a:bodyPr/>
+          <a:lstStyle/>
+          <a:p>
+            <a:endParaRPr lang="en-US" dirty="0"/>
+          </a:p>
+        </p:txBody>
+      </p:sp>
+      <p:sp>
+        <p:nvSpPr>
+          <p:cNvPr id="4" name="Slide Number Placeholder 3"/>
+          <p:cNvSpPr>
+            <a:spLocks noGrp="1"/>
+          </p:cNvSpPr>
+          <p:nvPr>
+            <p:ph type="sldNum" sz="quarter" idx="10"/>
+          </p:nvPr>
+        </p:nvSpPr>
+        <p:spPr/>
+        <p:txBody>
+          <a:bodyPr/>
+          <a:lstStyle/>
+          <a:p>
+            <a:fld id="{A51C0C35-A9A2-4EFD-9BAF-1E52E29E03D1}" type="slidenum">
+              <a:rPr lang="de-CH" smtClean="0"/>
+              <a:t>4</a:t>
+            </a:fld>
+            <a:endParaRPr lang="de-CH"/>
+          </a:p>
+        </p:txBody>
+      </p:sp>
+    </p:spTree>
+    <p:extLst>
+      <p:ext uri="{BB962C8B-B14F-4D97-AF65-F5344CB8AC3E}">
+        <p14:creationId xmlns:p14="http://schemas.microsoft.com/office/powerpoint/2010/main" val="1516757331"/>
+      </p:ext>
+    </p:extLst>
+  </p:cSld>
+  <p:clrMapOvr>
+    <a:masterClrMapping/>
+  </p:clrMapOvr>
+</p:notes>
+</file>
+
+<file path=ppt/notesSlides/notesSlide5.xml><?xml version="1.0" encoding="utf-8"?>
+<p:notes xmlns:a="http://schemas.openxmlformats.org/drawingml/2006/main" xmlns:r="http://schemas.openxmlformats.org/officeDocument/2006/relationships" xmlns:p="http://schemas.openxmlformats.org/presentationml/2006/main">
+  <p:cSld>
+    <p:spTree>
+      <p:nvGrpSpPr>
+        <p:cNvPr id="1" name=""/>
+        <p:cNvGrpSpPr/>
+        <p:nvPr/>
+      </p:nvGrpSpPr>
+      <p:grpSpPr>
+        <a:xfrm>
+          <a:off x="0" y="0"/>
+          <a:ext cx="0" cy="0"/>
+          <a:chOff x="0" y="0"/>
+          <a:chExt cx="0" cy="0"/>
+        </a:xfrm>
+      </p:grpSpPr>
+      <p:sp>
+        <p:nvSpPr>
+          <p:cNvPr id="2" name="Slide Image Placeholder 1"/>
+          <p:cNvSpPr>
+            <a:spLocks noGrp="1" noRot="1" noChangeAspect="1"/>
+          </p:cNvSpPr>
+          <p:nvPr>
+            <p:ph type="sldImg"/>
+          </p:nvPr>
+        </p:nvSpPr>
+        <p:spPr/>
+      </p:sp>
+      <p:sp>
+        <p:nvSpPr>
+          <p:cNvPr id="3" name="Notes Placeholder 2"/>
+          <p:cNvSpPr>
+            <a:spLocks noGrp="1"/>
+          </p:cNvSpPr>
+          <p:nvPr>
+            <p:ph type="body" idx="1"/>
+          </p:nvPr>
+        </p:nvSpPr>
+        <p:spPr/>
+        <p:txBody>
+          <a:bodyPr/>
+          <a:lstStyle/>
+          <a:p>
+            <a:endParaRPr lang="en-US" dirty="0"/>
+          </a:p>
+        </p:txBody>
+      </p:sp>
+      <p:sp>
+        <p:nvSpPr>
+          <p:cNvPr id="4" name="Slide Number Placeholder 3"/>
+          <p:cNvSpPr>
+            <a:spLocks noGrp="1"/>
+          </p:cNvSpPr>
+          <p:nvPr>
+            <p:ph type="sldNum" sz="quarter" idx="10"/>
+          </p:nvPr>
+        </p:nvSpPr>
+        <p:spPr/>
+        <p:txBody>
+          <a:bodyPr/>
+          <a:lstStyle/>
+          <a:p>
+            <a:fld id="{A51C0C35-A9A2-4EFD-9BAF-1E52E29E03D1}" type="slidenum">
+              <a:rPr lang="de-CH" smtClean="0"/>
+              <a:t>5</a:t>
+            </a:fld>
+            <a:endParaRPr lang="de-CH"/>
+          </a:p>
+        </p:txBody>
+      </p:sp>
+    </p:spTree>
+    <p:extLst>
+      <p:ext uri="{BB962C8B-B14F-4D97-AF65-F5344CB8AC3E}">
+        <p14:creationId xmlns:p14="http://schemas.microsoft.com/office/powerpoint/2010/main" val="1516757331"/>
+      </p:ext>
+    </p:extLst>
+  </p:cSld>
+  <p:clrMapOvr>
+    <a:masterClrMapping/>
+  </p:clrMapOvr>
+</p:notes>
+</file>
+
+<file path=ppt/notesSlides/notesSlide6.xml><?xml version="1.0" encoding="utf-8"?>
+<p:notes xmlns:a="http://schemas.openxmlformats.org/drawingml/2006/main" xmlns:r="http://schemas.openxmlformats.org/officeDocument/2006/relationships" xmlns:p="http://schemas.openxmlformats.org/presentationml/2006/main">
+  <p:cSld>
+    <p:spTree>
+      <p:nvGrpSpPr>
+        <p:cNvPr id="1" name=""/>
+        <p:cNvGrpSpPr/>
+        <p:nvPr/>
+      </p:nvGrpSpPr>
+      <p:grpSpPr>
+        <a:xfrm>
+          <a:off x="0" y="0"/>
+          <a:ext cx="0" cy="0"/>
+          <a:chOff x="0" y="0"/>
+          <a:chExt cx="0" cy="0"/>
+        </a:xfrm>
+      </p:grpSpPr>
+      <p:sp>
+        <p:nvSpPr>
+          <p:cNvPr id="2" name="Slide Image Placeholder 1"/>
+          <p:cNvSpPr>
+            <a:spLocks noGrp="1" noRot="1" noChangeAspect="1"/>
+          </p:cNvSpPr>
+          <p:nvPr>
+            <p:ph type="sldImg"/>
+          </p:nvPr>
+        </p:nvSpPr>
+        <p:spPr/>
+      </p:sp>
+      <p:sp>
+        <p:nvSpPr>
+          <p:cNvPr id="3" name="Notes Placeholder 2"/>
+          <p:cNvSpPr>
+            <a:spLocks noGrp="1"/>
+          </p:cNvSpPr>
+          <p:nvPr>
+            <p:ph type="body" idx="1"/>
+          </p:nvPr>
+        </p:nvSpPr>
+        <p:spPr/>
+        <p:txBody>
+          <a:bodyPr/>
+          <a:lstStyle/>
+          <a:p>
+            <a:endParaRPr lang="en-US" dirty="0"/>
+          </a:p>
+        </p:txBody>
+      </p:sp>
+      <p:sp>
+        <p:nvSpPr>
+          <p:cNvPr id="4" name="Slide Number Placeholder 3"/>
+          <p:cNvSpPr>
+            <a:spLocks noGrp="1"/>
+          </p:cNvSpPr>
+          <p:nvPr>
+            <p:ph type="sldNum" sz="quarter" idx="10"/>
+          </p:nvPr>
+        </p:nvSpPr>
+        <p:spPr/>
+        <p:txBody>
+          <a:bodyPr/>
+          <a:lstStyle/>
+          <a:p>
+            <a:fld id="{A51C0C35-A9A2-4EFD-9BAF-1E52E29E03D1}" type="slidenum">
+              <a:rPr lang="de-CH" smtClean="0"/>
+              <a:t>6</a:t>
+            </a:fld>
+            <a:endParaRPr lang="de-CH"/>
+          </a:p>
+        </p:txBody>
+      </p:sp>
+    </p:spTree>
+    <p:extLst>
+      <p:ext uri="{BB962C8B-B14F-4D97-AF65-F5344CB8AC3E}">
+        <p14:creationId xmlns:p14="http://schemas.microsoft.com/office/powerpoint/2010/main" val="1516757331"/>
+      </p:ext>
+    </p:extLst>
+  </p:cSld>
+  <p:clrMapOvr>
+    <a:masterClrMapping/>
+  </p:clrMapOvr>
+</p:notes>
+</file>
+
 <file path=ppt/slideLayouts/slideLayout1.xml><?xml version="1.0" encoding="utf-8"?>
 <p:sldLayout xmlns:a="http://schemas.openxmlformats.org/drawingml/2006/main" xmlns:r="http://schemas.openxmlformats.org/officeDocument/2006/relationships" xmlns:p="http://schemas.openxmlformats.org/presentationml/2006/main" preserve="1" userDrawn="1">
   <p:cSld name="Titelfolie A CMASLab 1">
@@ -876,7 +1216,7 @@
           <a:p>
             <a:fld id="{92BF4FBE-0522-49A2-A01E-13F521B4C0B7}" type="datetime1">
               <a:rPr lang="de-DE" smtClean="0"/>
-              <a:t>18.07.2017</a:t>
+              <a:t>19.07.2017</a:t>
             </a:fld>
             <a:endParaRPr lang="de-DE"/>
           </a:p>
@@ -1100,7 +1440,7 @@
           <a:p>
             <a:fld id="{681F6098-E9E1-42B4-9C80-2F52B9453439}" type="datetime1">
               <a:rPr lang="de-DE" smtClean="0"/>
-              <a:t>18.07.2017</a:t>
+              <a:t>19.07.2017</a:t>
             </a:fld>
             <a:endParaRPr lang="de-DE"/>
           </a:p>
@@ -1371,7 +1711,7 @@
           <a:p>
             <a:fld id="{0E397BD4-0686-495C-8D8F-54DB8CB790DF}" type="datetime1">
               <a:rPr lang="de-DE" smtClean="0"/>
-              <a:t>18.07.2017</a:t>
+              <a:t>19.07.2017</a:t>
             </a:fld>
             <a:endParaRPr lang="de-DE"/>
           </a:p>
@@ -1672,7 +2012,7 @@
           <a:p>
             <a:fld id="{0E397BD4-0686-495C-8D8F-54DB8CB790DF}" type="datetime1">
               <a:rPr lang="de-DE" smtClean="0"/>
-              <a:t>18.07.2017</a:t>
+              <a:t>19.07.2017</a:t>
             </a:fld>
             <a:endParaRPr lang="de-DE"/>
           </a:p>
@@ -2300,7 +2640,7 @@
           <a:p>
             <a:fld id="{3B2F6CB8-9391-4BED-909F-C47A979AE1C4}" type="datetime1">
               <a:rPr lang="de-DE" smtClean="0"/>
-              <a:t>18.07.2017</a:t>
+              <a:t>19.07.2017</a:t>
             </a:fld>
             <a:endParaRPr lang="de-DE"/>
           </a:p>
@@ -2625,7 +2965,7 @@
           <a:p>
             <a:fld id="{C6A1628A-2A40-4B37-B167-309C0EBB4BBF}" type="datetime1">
               <a:rPr lang="de-DE" smtClean="0"/>
-              <a:t>18.07.2017</a:t>
+              <a:t>19.07.2017</a:t>
             </a:fld>
             <a:endParaRPr lang="de-DE"/>
           </a:p>
@@ -2748,7 +3088,7 @@
           <a:p>
             <a:fld id="{64AE1E89-2EE0-4320-B5A2-F15E505D5862}" type="datetime1">
               <a:rPr lang="de-DE" smtClean="0"/>
-              <a:t>18.07.2017</a:t>
+              <a:t>19.07.2017</a:t>
             </a:fld>
             <a:endParaRPr lang="de-DE"/>
           </a:p>
@@ -2867,7 +3207,7 @@
           <a:p>
             <a:fld id="{7D860B62-60FD-48EF-B2F4-6E7265AD3459}" type="datetime1">
               <a:rPr lang="de-DE" smtClean="0"/>
-              <a:t>18.07.2017</a:t>
+              <a:t>19.07.2017</a:t>
             </a:fld>
             <a:endParaRPr lang="de-DE"/>
           </a:p>
@@ -3002,7 +3342,7 @@
           <a:p>
             <a:fld id="{7F4A91D9-FBFE-4ACC-A99A-BC74A6E03CC5}" type="datetime1">
               <a:rPr lang="de-DE" smtClean="0"/>
-              <a:t>18.07.2017</a:t>
+              <a:t>19.07.2017</a:t>
             </a:fld>
             <a:endParaRPr lang="de-DE"/>
           </a:p>
@@ -3392,7 +3732,7 @@
           <a:p>
             <a:fld id="{BD23B19E-8C35-419D-B8B2-87612A89E43F}" type="datetime1">
               <a:rPr lang="de-DE" smtClean="0"/>
-              <a:t>18.07.2017</a:t>
+              <a:t>19.07.2017</a:t>
             </a:fld>
             <a:endParaRPr lang="de-DE" dirty="0"/>
           </a:p>
@@ -4099,7 +4439,7 @@
           <a:p>
             <a:fld id="{92BF4FBE-0522-49A2-A01E-13F521B4C0B7}" type="datetime1">
               <a:rPr lang="de-DE" smtClean="0"/>
-              <a:t>18.07.2017</a:t>
+              <a:t>19.07.2017</a:t>
             </a:fld>
             <a:endParaRPr lang="de-DE"/>
           </a:p>
@@ -4237,7 +4577,7 @@
           <a:p>
             <a:fld id="{3B2F6CB8-9391-4BED-909F-C47A979AE1C4}" type="datetime1">
               <a:rPr lang="de-DE" smtClean="0"/>
-              <a:t>18.07.2017</a:t>
+              <a:t>19.07.2017</a:t>
             </a:fld>
             <a:endParaRPr lang="de-DE"/>
           </a:p>
@@ -4316,138 +4656,16 @@
           </a:p>
         </p:txBody>
       </p:sp>
-      <p:sp>
-        <p:nvSpPr>
-          <p:cNvPr id="7" name="TextBox 6"/>
-          <p:cNvSpPr txBox="1"/>
-          <p:nvPr/>
-        </p:nvSpPr>
-        <p:spPr>
-          <a:xfrm>
-            <a:off x="6577551" y="1424786"/>
-            <a:ext cx="5178056" cy="369332"/>
-          </a:xfrm>
-          <a:prstGeom prst="rect">
-            <a:avLst/>
-          </a:prstGeom>
-          <a:noFill/>
-        </p:spPr>
-        <p:txBody>
-          <a:bodyPr wrap="square" rtlCol="0">
-            <a:spAutoFit/>
-          </a:bodyPr>
-          <a:lstStyle/>
-          <a:p>
-            <a:pPr algn="ctr"/>
-            <a:r>
-              <a:rPr lang="es-ES" noProof="1"/>
-              <a:t>Gust alleviation</a:t>
-            </a:r>
-            <a:endParaRPr lang="en-US" noProof="1"/>
-          </a:p>
-        </p:txBody>
-      </p:sp>
-      <p:sp>
-        <p:nvSpPr>
-          <p:cNvPr id="12" name="TextBox 11"/>
-          <p:cNvSpPr txBox="1"/>
-          <p:nvPr/>
-        </p:nvSpPr>
-        <p:spPr>
-          <a:xfrm>
-            <a:off x="792101" y="1842629"/>
-            <a:ext cx="5301517" cy="369332"/>
-          </a:xfrm>
-          <a:prstGeom prst="rect">
-            <a:avLst/>
-          </a:prstGeom>
-          <a:noFill/>
-        </p:spPr>
-        <p:txBody>
-          <a:bodyPr wrap="square" rtlCol="0">
-            <a:spAutoFit/>
-          </a:bodyPr>
-          <a:lstStyle/>
-          <a:p>
-            <a:pPr algn="ctr"/>
-            <a:r>
-              <a:rPr lang="es-ES" noProof="1"/>
-              <a:t>Wing demonstrator</a:t>
-            </a:r>
-            <a:endParaRPr lang="en-US" noProof="1"/>
-          </a:p>
-        </p:txBody>
-      </p:sp>
       <p:pic>
         <p:nvPicPr>
-          <p:cNvPr id="2" name="Picture 1"/>
-          <p:cNvPicPr>
-            <a:picLocks noChangeAspect="1"/>
-          </p:cNvPicPr>
-          <p:nvPr/>
-        </p:nvPicPr>
-        <p:blipFill>
-          <a:blip r:embed="rId3">
-            <a:extLst>
-              <a:ext uri="{28A0092B-C50C-407E-A947-70E740481C1C}">
-                <a14:useLocalDpi xmlns:a14="http://schemas.microsoft.com/office/drawing/2010/main" val="0"/>
-              </a:ext>
-            </a:extLst>
-          </a:blip>
-          <a:stretch>
-            <a:fillRect/>
-          </a:stretch>
-        </p:blipFill>
-        <p:spPr>
-          <a:xfrm>
-            <a:off x="6373381" y="2027295"/>
-            <a:ext cx="5586396" cy="1738724"/>
-          </a:xfrm>
-          <a:prstGeom prst="rect">
-            <a:avLst/>
-          </a:prstGeom>
-        </p:spPr>
-      </p:pic>
-      <p:pic>
-        <p:nvPicPr>
-          <p:cNvPr id="9" name="Picture 8"/>
-          <p:cNvPicPr>
-            <a:picLocks noChangeAspect="1"/>
-          </p:cNvPicPr>
-          <p:nvPr/>
-        </p:nvPicPr>
-        <p:blipFill>
-          <a:blip r:embed="rId4">
-            <a:extLst>
-              <a:ext uri="{28A0092B-C50C-407E-A947-70E740481C1C}">
-                <a14:useLocalDpi xmlns:a14="http://schemas.microsoft.com/office/drawing/2010/main" val="0"/>
-              </a:ext>
-            </a:extLst>
-          </a:blip>
-          <a:stretch>
-            <a:fillRect/>
-          </a:stretch>
-        </p:blipFill>
-        <p:spPr>
-          <a:xfrm>
-            <a:off x="6645003" y="4066022"/>
-            <a:ext cx="5043153" cy="1786679"/>
-          </a:xfrm>
-          <a:prstGeom prst="rect">
-            <a:avLst/>
-          </a:prstGeom>
-        </p:spPr>
-      </p:pic>
-      <p:pic>
-        <p:nvPicPr>
-          <p:cNvPr id="2050" name="Picture 2"/>
+          <p:cNvPr id="1026" name="Picture 2"/>
           <p:cNvPicPr>
             <a:picLocks noChangeAspect="1" noChangeArrowheads="1"/>
           </p:cNvPicPr>
           <p:nvPr/>
         </p:nvPicPr>
         <p:blipFill>
-          <a:blip r:embed="rId5">
+          <a:blip r:embed="rId3">
             <a:extLst>
               <a:ext uri="{28A0092B-C50C-407E-A947-70E740481C1C}">
                 <a14:useLocalDpi xmlns:a14="http://schemas.microsoft.com/office/drawing/2010/main" val="0"/>
@@ -4461,8 +4679,8 @@
         </p:blipFill>
         <p:spPr bwMode="auto">
           <a:xfrm>
-            <a:off x="1035491" y="2647013"/>
-            <a:ext cx="4814739" cy="3012385"/>
+            <a:off x="8273143" y="997266"/>
+            <a:ext cx="3482464" cy="4865372"/>
           </a:xfrm>
           <a:prstGeom prst="rect">
             <a:avLst/>
@@ -4504,14 +4722,14 @@
       </p:pic>
       <p:sp>
         <p:nvSpPr>
-          <p:cNvPr id="11" name="TextBox 10"/>
+          <p:cNvPr id="13" name="TextBox 12"/>
           <p:cNvSpPr txBox="1"/>
           <p:nvPr/>
         </p:nvSpPr>
         <p:spPr>
           <a:xfrm>
-            <a:off x="2239752" y="5728734"/>
-            <a:ext cx="2406213" cy="369332"/>
+            <a:off x="603414" y="1213809"/>
+            <a:ext cx="5301517" cy="369332"/>
           </a:xfrm>
           <a:prstGeom prst="rect">
             <a:avLst/>
@@ -4524,19 +4742,1436 @@
           </a:bodyPr>
           <a:lstStyle/>
           <a:p>
-            <a:pPr algn="ctr"/>
-            <a:r>
-              <a:rPr lang="de-CH" dirty="0"/>
-              <a:t>Raither(2013) </a:t>
-            </a:r>
-            <a:endParaRPr lang="en-US" dirty="0"/>
-          </a:p>
-        </p:txBody>
-      </p:sp>
+            <a:r>
+              <a:rPr lang="es-ES" noProof="1" smtClean="0"/>
+              <a:t>Parametric study based on analytical model</a:t>
+            </a:r>
+            <a:endParaRPr lang="en-US" noProof="1"/>
+          </a:p>
+        </p:txBody>
+      </p:sp>
+      <p:pic>
+        <p:nvPicPr>
+          <p:cNvPr id="1027" name="Picture 3"/>
+          <p:cNvPicPr>
+            <a:picLocks noChangeAspect="1" noChangeArrowheads="1"/>
+          </p:cNvPicPr>
+          <p:nvPr/>
+        </p:nvPicPr>
+        <p:blipFill>
+          <a:blip r:embed="rId4">
+            <a:extLst>
+              <a:ext uri="{28A0092B-C50C-407E-A947-70E740481C1C}">
+                <a14:useLocalDpi xmlns:a14="http://schemas.microsoft.com/office/drawing/2010/main" val="0"/>
+              </a:ext>
+            </a:extLst>
+          </a:blip>
+          <a:srcRect/>
+          <a:stretch>
+            <a:fillRect/>
+          </a:stretch>
+        </p:blipFill>
+        <p:spPr bwMode="auto">
+          <a:xfrm>
+            <a:off x="1541689" y="2365829"/>
+            <a:ext cx="5326286" cy="3308577"/>
+          </a:xfrm>
+          <a:prstGeom prst="rect">
+            <a:avLst/>
+          </a:prstGeom>
+          <a:noFill/>
+          <a:ln>
+            <a:noFill/>
+          </a:ln>
+          <a:effectLst/>
+          <a:extLst>
+            <a:ext uri="{909E8E84-426E-40DD-AFC4-6F175D3DCCD1}">
+              <a14:hiddenFill xmlns:a14="http://schemas.microsoft.com/office/drawing/2010/main">
+                <a:solidFill>
+                  <a:schemeClr val="accent1"/>
+                </a:solidFill>
+              </a14:hiddenFill>
+            </a:ext>
+            <a:ext uri="{91240B29-F687-4F45-9708-019B960494DF}">
+              <a14:hiddenLine xmlns:a14="http://schemas.microsoft.com/office/drawing/2010/main" w="9525">
+                <a:solidFill>
+                  <a:schemeClr val="tx1"/>
+                </a:solidFill>
+                <a:miter lim="800000"/>
+                <a:headEnd/>
+                <a:tailEnd/>
+              </a14:hiddenLine>
+            </a:ext>
+            <a:ext uri="{AF507438-7753-43E0-B8FC-AC1667EBCBE1}">
+              <a14:hiddenEffects xmlns:a14="http://schemas.microsoft.com/office/drawing/2010/main">
+                <a:effectLst>
+                  <a:outerShdw dist="35921" dir="2700000" algn="ctr" rotWithShape="0">
+                    <a:schemeClr val="bg2"/>
+                  </a:outerShdw>
+                </a:effectLst>
+              </a14:hiddenEffects>
+            </a:ext>
+          </a:extLst>
+        </p:spPr>
+      </p:pic>
     </p:spTree>
     <p:extLst>
       <p:ext uri="{BB962C8B-B14F-4D97-AF65-F5344CB8AC3E}">
-        <p14:creationId xmlns:p14="http://schemas.microsoft.com/office/powerpoint/2010/main" val="33734617"/>
+        <p14:creationId xmlns:p14="http://schemas.microsoft.com/office/powerpoint/2010/main" val="520447700"/>
+      </p:ext>
+    </p:extLst>
+  </p:cSld>
+  <p:clrMapOvr>
+    <a:masterClrMapping/>
+  </p:clrMapOvr>
+  <p:transition>
+    <p:fade/>
+  </p:transition>
+</p:sld>
+</file>
+
+<file path=ppt/slides/slide3.xml><?xml version="1.0" encoding="utf-8"?>
+<p:sld xmlns:a="http://schemas.openxmlformats.org/drawingml/2006/main" xmlns:r="http://schemas.openxmlformats.org/officeDocument/2006/relationships" xmlns:p="http://schemas.openxmlformats.org/presentationml/2006/main">
+  <p:cSld>
+    <p:spTree>
+      <p:nvGrpSpPr>
+        <p:cNvPr id="1" name=""/>
+        <p:cNvGrpSpPr/>
+        <p:nvPr/>
+      </p:nvGrpSpPr>
+      <p:grpSpPr>
+        <a:xfrm>
+          <a:off x="0" y="0"/>
+          <a:ext cx="0" cy="0"/>
+          <a:chOff x="0" y="0"/>
+          <a:chExt cx="0" cy="0"/>
+        </a:xfrm>
+      </p:grpSpPr>
+      <p:sp>
+        <p:nvSpPr>
+          <p:cNvPr id="3" name="Datumsplatzhalter 2"/>
+          <p:cNvSpPr>
+            <a:spLocks noGrp="1"/>
+          </p:cNvSpPr>
+          <p:nvPr>
+            <p:ph type="dt" sz="half" idx="10"/>
+          </p:nvPr>
+        </p:nvSpPr>
+        <p:spPr/>
+        <p:txBody>
+          <a:bodyPr/>
+          <a:lstStyle/>
+          <a:p>
+            <a:fld id="{3B2F6CB8-9391-4BED-909F-C47A979AE1C4}" type="datetime1">
+              <a:rPr lang="de-DE" smtClean="0"/>
+              <a:t>19.07.2017</a:t>
+            </a:fld>
+            <a:endParaRPr lang="de-DE"/>
+          </a:p>
+        </p:txBody>
+      </p:sp>
+      <p:sp>
+        <p:nvSpPr>
+          <p:cNvPr id="4" name="Fußzeilenplatzhalter 3"/>
+          <p:cNvSpPr>
+            <a:spLocks noGrp="1"/>
+          </p:cNvSpPr>
+          <p:nvPr>
+            <p:ph type="ftr" sz="quarter" idx="11"/>
+          </p:nvPr>
+        </p:nvSpPr>
+        <p:spPr/>
+        <p:txBody>
+          <a:bodyPr/>
+          <a:lstStyle/>
+          <a:p>
+            <a:r>
+              <a:rPr lang="de-DE" dirty="0"/>
+              <a:t>Valverde, Alejandro</a:t>
+            </a:r>
+          </a:p>
+        </p:txBody>
+      </p:sp>
+      <p:sp>
+        <p:nvSpPr>
+          <p:cNvPr id="5" name="Foliennummernplatzhalter 4"/>
+          <p:cNvSpPr>
+            <a:spLocks noGrp="1"/>
+          </p:cNvSpPr>
+          <p:nvPr>
+            <p:ph type="sldNum" sz="quarter" idx="12"/>
+          </p:nvPr>
+        </p:nvSpPr>
+        <p:spPr/>
+        <p:txBody>
+          <a:bodyPr/>
+          <a:lstStyle/>
+          <a:p>
+            <a:fld id="{6C6AE60A-B69C-4790-82F7-3882EDF23186}" type="slidenum">
+              <a:rPr lang="de-DE" smtClean="0"/>
+              <a:t>3</a:t>
+            </a:fld>
+            <a:endParaRPr lang="de-DE"/>
+          </a:p>
+        </p:txBody>
+      </p:sp>
+      <p:sp>
+        <p:nvSpPr>
+          <p:cNvPr id="6" name="Titel 5"/>
+          <p:cNvSpPr>
+            <a:spLocks noGrp="1"/>
+          </p:cNvSpPr>
+          <p:nvPr>
+            <p:ph type="title"/>
+          </p:nvPr>
+        </p:nvSpPr>
+        <p:spPr>
+          <a:xfrm>
+            <a:off x="431632" y="620714"/>
+            <a:ext cx="11323975" cy="450205"/>
+          </a:xfrm>
+        </p:spPr>
+        <p:txBody>
+          <a:bodyPr anchor="t"/>
+          <a:lstStyle/>
+          <a:p>
+            <a:r>
+              <a:rPr lang="de-CH" dirty="0" smtClean="0"/>
+              <a:t>Abaqus model</a:t>
+            </a:r>
+            <a:endParaRPr lang="de-CH" dirty="0"/>
+          </a:p>
+        </p:txBody>
+      </p:sp>
+      <p:sp>
+        <p:nvSpPr>
+          <p:cNvPr id="7" name="TextBox 6"/>
+          <p:cNvSpPr txBox="1"/>
+          <p:nvPr/>
+        </p:nvSpPr>
+        <p:spPr>
+          <a:xfrm>
+            <a:off x="529088" y="1398277"/>
+            <a:ext cx="5178056" cy="4247317"/>
+          </a:xfrm>
+          <a:prstGeom prst="rect">
+            <a:avLst/>
+          </a:prstGeom>
+          <a:noFill/>
+        </p:spPr>
+        <p:txBody>
+          <a:bodyPr wrap="square" rtlCol="0">
+            <a:spAutoFit/>
+          </a:bodyPr>
+          <a:lstStyle/>
+          <a:p>
+            <a:r>
+              <a:rPr lang="es-ES" noProof="1" smtClean="0"/>
+              <a:t>Set of parameters:</a:t>
+            </a:r>
+          </a:p>
+          <a:p>
+            <a:pPr marL="742950" lvl="1" indent="-285750">
+              <a:buFont typeface="Arial" pitchFamily="34" charset="0"/>
+              <a:buChar char="•"/>
+            </a:pPr>
+            <a:r>
+              <a:rPr lang="en-US" noProof="1" smtClean="0"/>
+              <a:t>Length spanwise: 815mm</a:t>
+            </a:r>
+            <a:endParaRPr lang="en-US" noProof="1"/>
+          </a:p>
+          <a:p>
+            <a:pPr marL="742950" lvl="1" indent="-285750">
+              <a:buFont typeface="Arial" pitchFamily="34" charset="0"/>
+              <a:buChar char="•"/>
+            </a:pPr>
+            <a:r>
+              <a:rPr lang="en-US" noProof="1" smtClean="0"/>
+              <a:t>Length transversal: 529mm</a:t>
+            </a:r>
+          </a:p>
+          <a:p>
+            <a:pPr marL="742950" lvl="1" indent="-285750">
+              <a:buFont typeface="Arial" pitchFamily="34" charset="0"/>
+              <a:buChar char="•"/>
+            </a:pPr>
+            <a:r>
+              <a:rPr lang="es-ES" noProof="1" smtClean="0"/>
+              <a:t>Length chordwise: 300mm</a:t>
+            </a:r>
+          </a:p>
+          <a:p>
+            <a:pPr marL="742950" lvl="1" indent="-285750">
+              <a:buFont typeface="Arial" pitchFamily="34" charset="0"/>
+              <a:buChar char="•"/>
+            </a:pPr>
+            <a:r>
+              <a:rPr lang="es-ES" noProof="1" smtClean="0"/>
+              <a:t>Thickness box: 0.8mm</a:t>
+            </a:r>
+          </a:p>
+          <a:p>
+            <a:pPr marL="742950" lvl="1" indent="-285750">
+              <a:buFont typeface="Arial" pitchFamily="34" charset="0"/>
+              <a:buChar char="•"/>
+            </a:pPr>
+            <a:r>
+              <a:rPr lang="es-ES" noProof="1" smtClean="0"/>
+              <a:t>Thickness chiral lattice: 0.5mm</a:t>
+            </a:r>
+          </a:p>
+          <a:p>
+            <a:pPr marL="742950" lvl="1" indent="-285750">
+              <a:buFont typeface="Arial" pitchFamily="34" charset="0"/>
+              <a:buChar char="•"/>
+            </a:pPr>
+            <a:endParaRPr lang="es-ES" noProof="1"/>
+          </a:p>
+          <a:p>
+            <a:r>
+              <a:rPr lang="es-ES" noProof="1" smtClean="0"/>
+              <a:t>BC’s and force</a:t>
+            </a:r>
+          </a:p>
+          <a:p>
+            <a:pPr marL="742950" lvl="1" indent="-285750">
+              <a:buFont typeface="Arial" pitchFamily="34" charset="0"/>
+              <a:buChar char="•"/>
+            </a:pPr>
+            <a:r>
+              <a:rPr lang="es-ES" noProof="1" smtClean="0"/>
+              <a:t>Limited to 1000N</a:t>
+            </a:r>
+          </a:p>
+          <a:p>
+            <a:pPr marL="742950" lvl="1" indent="-285750">
+              <a:buFont typeface="Arial" pitchFamily="34" charset="0"/>
+              <a:buChar char="•"/>
+            </a:pPr>
+            <a:r>
+              <a:rPr lang="es-ES" noProof="1" smtClean="0"/>
+              <a:t>Clamped at root</a:t>
+            </a:r>
+          </a:p>
+          <a:p>
+            <a:pPr marL="742950" lvl="1" indent="-285750">
+              <a:buFont typeface="Arial" pitchFamily="34" charset="0"/>
+              <a:buChar char="•"/>
+            </a:pPr>
+            <a:endParaRPr lang="es-ES" noProof="1"/>
+          </a:p>
+          <a:p>
+            <a:r>
+              <a:rPr lang="es-ES" noProof="1" smtClean="0"/>
+              <a:t>Results</a:t>
+            </a:r>
+          </a:p>
+          <a:p>
+            <a:pPr marL="742950" lvl="1" indent="-285750">
+              <a:buFont typeface="Arial" pitchFamily="34" charset="0"/>
+              <a:buChar char="•"/>
+            </a:pPr>
+            <a:r>
+              <a:rPr lang="es-ES" noProof="1" smtClean="0"/>
+              <a:t>Twist: 0.5&lt;</a:t>
+            </a:r>
+            <a:r>
+              <a:rPr lang="el-GR" noProof="1" smtClean="0"/>
+              <a:t>φ</a:t>
+            </a:r>
+            <a:r>
+              <a:rPr lang="es-ES" noProof="1" smtClean="0"/>
+              <a:t>&lt;1 deg</a:t>
+            </a:r>
+          </a:p>
+          <a:p>
+            <a:pPr marL="742950" lvl="1" indent="-285750">
+              <a:buFont typeface="Arial" pitchFamily="34" charset="0"/>
+              <a:buChar char="•"/>
+            </a:pPr>
+            <a:r>
+              <a:rPr lang="es-ES" noProof="1" smtClean="0"/>
+              <a:t>Vertical displacement at tip: 1&lt;U2&lt;2.5 mm </a:t>
+            </a:r>
+            <a:endParaRPr lang="en-US" noProof="1"/>
+          </a:p>
+        </p:txBody>
+      </p:sp>
+      <p:pic>
+        <p:nvPicPr>
+          <p:cNvPr id="2050" name="Picture 2"/>
+          <p:cNvPicPr>
+            <a:picLocks noChangeAspect="1" noChangeArrowheads="1"/>
+          </p:cNvPicPr>
+          <p:nvPr/>
+        </p:nvPicPr>
+        <p:blipFill>
+          <a:blip r:embed="rId3">
+            <a:extLst>
+              <a:ext uri="{28A0092B-C50C-407E-A947-70E740481C1C}">
+                <a14:useLocalDpi xmlns:a14="http://schemas.microsoft.com/office/drawing/2010/main" val="0"/>
+              </a:ext>
+            </a:extLst>
+          </a:blip>
+          <a:srcRect/>
+          <a:stretch>
+            <a:fillRect/>
+          </a:stretch>
+        </p:blipFill>
+        <p:spPr bwMode="auto">
+          <a:xfrm>
+            <a:off x="5504737" y="1748588"/>
+            <a:ext cx="6250870" cy="3657519"/>
+          </a:xfrm>
+          <a:prstGeom prst="rect">
+            <a:avLst/>
+          </a:prstGeom>
+          <a:noFill/>
+          <a:ln>
+            <a:noFill/>
+          </a:ln>
+          <a:effectLst/>
+          <a:extLst>
+            <a:ext uri="{909E8E84-426E-40DD-AFC4-6F175D3DCCD1}">
+              <a14:hiddenFill xmlns:a14="http://schemas.microsoft.com/office/drawing/2010/main">
+                <a:solidFill>
+                  <a:schemeClr val="accent1"/>
+                </a:solidFill>
+              </a14:hiddenFill>
+            </a:ext>
+            <a:ext uri="{91240B29-F687-4F45-9708-019B960494DF}">
+              <a14:hiddenLine xmlns:a14="http://schemas.microsoft.com/office/drawing/2010/main" w="9525">
+                <a:solidFill>
+                  <a:schemeClr val="tx1"/>
+                </a:solidFill>
+                <a:miter lim="800000"/>
+                <a:headEnd/>
+                <a:tailEnd/>
+              </a14:hiddenLine>
+            </a:ext>
+            <a:ext uri="{AF507438-7753-43E0-B8FC-AC1667EBCBE1}">
+              <a14:hiddenEffects xmlns:a14="http://schemas.microsoft.com/office/drawing/2010/main">
+                <a:effectLst>
+                  <a:outerShdw dist="35921" dir="2700000" algn="ctr" rotWithShape="0">
+                    <a:schemeClr val="bg2"/>
+                  </a:outerShdw>
+                </a:effectLst>
+              </a14:hiddenEffects>
+            </a:ext>
+          </a:extLst>
+        </p:spPr>
+      </p:pic>
+    </p:spTree>
+    <p:extLst>
+      <p:ext uri="{BB962C8B-B14F-4D97-AF65-F5344CB8AC3E}">
+        <p14:creationId xmlns:p14="http://schemas.microsoft.com/office/powerpoint/2010/main" val="1731646673"/>
+      </p:ext>
+    </p:extLst>
+  </p:cSld>
+  <p:clrMapOvr>
+    <a:masterClrMapping/>
+  </p:clrMapOvr>
+  <p:transition>
+    <p:fade/>
+  </p:transition>
+</p:sld>
+</file>
+
+<file path=ppt/slides/slide4.xml><?xml version="1.0" encoding="utf-8"?>
+<p:sld xmlns:a="http://schemas.openxmlformats.org/drawingml/2006/main" xmlns:r="http://schemas.openxmlformats.org/officeDocument/2006/relationships" xmlns:p="http://schemas.openxmlformats.org/presentationml/2006/main">
+  <p:cSld>
+    <p:spTree>
+      <p:nvGrpSpPr>
+        <p:cNvPr id="1" name=""/>
+        <p:cNvGrpSpPr/>
+        <p:nvPr/>
+      </p:nvGrpSpPr>
+      <p:grpSpPr>
+        <a:xfrm>
+          <a:off x="0" y="0"/>
+          <a:ext cx="0" cy="0"/>
+          <a:chOff x="0" y="0"/>
+          <a:chExt cx="0" cy="0"/>
+        </a:xfrm>
+      </p:grpSpPr>
+      <p:sp>
+        <p:nvSpPr>
+          <p:cNvPr id="3" name="Datumsplatzhalter 2"/>
+          <p:cNvSpPr>
+            <a:spLocks noGrp="1"/>
+          </p:cNvSpPr>
+          <p:nvPr>
+            <p:ph type="dt" sz="half" idx="10"/>
+          </p:nvPr>
+        </p:nvSpPr>
+        <p:spPr/>
+        <p:txBody>
+          <a:bodyPr/>
+          <a:lstStyle/>
+          <a:p>
+            <a:fld id="{3B2F6CB8-9391-4BED-909F-C47A979AE1C4}" type="datetime1">
+              <a:rPr lang="de-DE" smtClean="0"/>
+              <a:t>19.07.2017</a:t>
+            </a:fld>
+            <a:endParaRPr lang="de-DE"/>
+          </a:p>
+        </p:txBody>
+      </p:sp>
+      <p:sp>
+        <p:nvSpPr>
+          <p:cNvPr id="4" name="Fußzeilenplatzhalter 3"/>
+          <p:cNvSpPr>
+            <a:spLocks noGrp="1"/>
+          </p:cNvSpPr>
+          <p:nvPr>
+            <p:ph type="ftr" sz="quarter" idx="11"/>
+          </p:nvPr>
+        </p:nvSpPr>
+        <p:spPr/>
+        <p:txBody>
+          <a:bodyPr/>
+          <a:lstStyle/>
+          <a:p>
+            <a:r>
+              <a:rPr lang="de-DE" dirty="0"/>
+              <a:t>Valverde, Alejandro</a:t>
+            </a:r>
+          </a:p>
+        </p:txBody>
+      </p:sp>
+      <p:sp>
+        <p:nvSpPr>
+          <p:cNvPr id="5" name="Foliennummernplatzhalter 4"/>
+          <p:cNvSpPr>
+            <a:spLocks noGrp="1"/>
+          </p:cNvSpPr>
+          <p:nvPr>
+            <p:ph type="sldNum" sz="quarter" idx="12"/>
+          </p:nvPr>
+        </p:nvSpPr>
+        <p:spPr/>
+        <p:txBody>
+          <a:bodyPr/>
+          <a:lstStyle/>
+          <a:p>
+            <a:fld id="{6C6AE60A-B69C-4790-82F7-3882EDF23186}" type="slidenum">
+              <a:rPr lang="de-DE" smtClean="0"/>
+              <a:t>4</a:t>
+            </a:fld>
+            <a:endParaRPr lang="de-DE"/>
+          </a:p>
+        </p:txBody>
+      </p:sp>
+      <p:sp>
+        <p:nvSpPr>
+          <p:cNvPr id="6" name="Titel 5"/>
+          <p:cNvSpPr>
+            <a:spLocks noGrp="1"/>
+          </p:cNvSpPr>
+          <p:nvPr>
+            <p:ph type="title"/>
+          </p:nvPr>
+        </p:nvSpPr>
+        <p:spPr>
+          <a:xfrm>
+            <a:off x="431632" y="620714"/>
+            <a:ext cx="11323975" cy="450205"/>
+          </a:xfrm>
+        </p:spPr>
+        <p:txBody>
+          <a:bodyPr anchor="t"/>
+          <a:lstStyle/>
+          <a:p>
+            <a:r>
+              <a:rPr lang="de-CH" dirty="0" smtClean="0"/>
+              <a:t>Abaqus model – Buckling characteristics</a:t>
+            </a:r>
+            <a:endParaRPr lang="de-CH" dirty="0"/>
+          </a:p>
+        </p:txBody>
+      </p:sp>
+      <p:sp>
+        <p:nvSpPr>
+          <p:cNvPr id="7" name="TextBox 6"/>
+          <p:cNvSpPr txBox="1"/>
+          <p:nvPr/>
+        </p:nvSpPr>
+        <p:spPr>
+          <a:xfrm>
+            <a:off x="529088" y="1398277"/>
+            <a:ext cx="5178056" cy="923330"/>
+          </a:xfrm>
+          <a:prstGeom prst="rect">
+            <a:avLst/>
+          </a:prstGeom>
+          <a:noFill/>
+        </p:spPr>
+        <p:txBody>
+          <a:bodyPr wrap="square" rtlCol="0">
+            <a:spAutoFit/>
+          </a:bodyPr>
+          <a:lstStyle/>
+          <a:p>
+            <a:r>
+              <a:rPr lang="es-ES" noProof="1" smtClean="0"/>
+              <a:t>Charactistics:</a:t>
+            </a:r>
+          </a:p>
+          <a:p>
+            <a:pPr marL="742950" lvl="1" indent="-285750">
+              <a:buFont typeface="Arial" pitchFamily="34" charset="0"/>
+              <a:buChar char="•"/>
+            </a:pPr>
+            <a:r>
+              <a:rPr lang="es-ES" noProof="1" smtClean="0"/>
+              <a:t>At root</a:t>
+            </a:r>
+          </a:p>
+          <a:p>
+            <a:pPr marL="742950" lvl="1" indent="-285750">
+              <a:buFont typeface="Arial" pitchFamily="34" charset="0"/>
+              <a:buChar char="•"/>
+            </a:pPr>
+            <a:r>
+              <a:rPr lang="es-ES" noProof="1" smtClean="0"/>
+              <a:t>It’s the main cause of lack of convergence</a:t>
+            </a:r>
+            <a:endParaRPr lang="es-ES" noProof="1"/>
+          </a:p>
+        </p:txBody>
+      </p:sp>
+      <p:pic>
+        <p:nvPicPr>
+          <p:cNvPr id="3074" name="Picture 2"/>
+          <p:cNvPicPr>
+            <a:picLocks noChangeAspect="1" noChangeArrowheads="1"/>
+          </p:cNvPicPr>
+          <p:nvPr/>
+        </p:nvPicPr>
+        <p:blipFill rotWithShape="1">
+          <a:blip r:embed="rId3" cstate="print">
+            <a:extLst>
+              <a:ext uri="{28A0092B-C50C-407E-A947-70E740481C1C}">
+                <a14:useLocalDpi xmlns:a14="http://schemas.microsoft.com/office/drawing/2010/main" val="0"/>
+              </a:ext>
+            </a:extLst>
+          </a:blip>
+          <a:srcRect l="2277" b="6502"/>
+          <a:stretch/>
+        </p:blipFill>
+        <p:spPr bwMode="auto">
+          <a:xfrm>
+            <a:off x="6031038" y="2743200"/>
+            <a:ext cx="5602870" cy="3367088"/>
+          </a:xfrm>
+          <a:prstGeom prst="rect">
+            <a:avLst/>
+          </a:prstGeom>
+          <a:noFill/>
+          <a:ln>
+            <a:noFill/>
+          </a:ln>
+          <a:effectLst/>
+          <a:extLst>
+            <a:ext uri="{909E8E84-426E-40DD-AFC4-6F175D3DCCD1}">
+              <a14:hiddenFill xmlns:a14="http://schemas.microsoft.com/office/drawing/2010/main">
+                <a:solidFill>
+                  <a:schemeClr val="accent1"/>
+                </a:solidFill>
+              </a14:hiddenFill>
+            </a:ext>
+            <a:ext uri="{91240B29-F687-4F45-9708-019B960494DF}">
+              <a14:hiddenLine xmlns:a14="http://schemas.microsoft.com/office/drawing/2010/main" w="9525">
+                <a:solidFill>
+                  <a:schemeClr val="tx1"/>
+                </a:solidFill>
+                <a:miter lim="800000"/>
+                <a:headEnd/>
+                <a:tailEnd/>
+              </a14:hiddenLine>
+            </a:ext>
+            <a:ext uri="{AF507438-7753-43E0-B8FC-AC1667EBCBE1}">
+              <a14:hiddenEffects xmlns:a14="http://schemas.microsoft.com/office/drawing/2010/main">
+                <a:effectLst>
+                  <a:outerShdw dist="35921" dir="2700000" algn="ctr" rotWithShape="0">
+                    <a:schemeClr val="bg2"/>
+                  </a:outerShdw>
+                </a:effectLst>
+              </a14:hiddenEffects>
+            </a:ext>
+          </a:extLst>
+        </p:spPr>
+      </p:pic>
+      <p:sp>
+        <p:nvSpPr>
+          <p:cNvPr id="9" name="TextBox 8"/>
+          <p:cNvSpPr txBox="1"/>
+          <p:nvPr/>
+        </p:nvSpPr>
+        <p:spPr>
+          <a:xfrm>
+            <a:off x="6031038" y="2267098"/>
+            <a:ext cx="5466271" cy="369332"/>
+          </a:xfrm>
+          <a:prstGeom prst="rect">
+            <a:avLst/>
+          </a:prstGeom>
+          <a:noFill/>
+        </p:spPr>
+        <p:txBody>
+          <a:bodyPr wrap="square" rtlCol="0">
+            <a:spAutoFit/>
+          </a:bodyPr>
+          <a:lstStyle/>
+          <a:p>
+            <a:pPr algn="ctr"/>
+            <a:r>
+              <a:rPr lang="es-ES" noProof="1" smtClean="0"/>
+              <a:t>No inner ribs</a:t>
+            </a:r>
+            <a:endParaRPr lang="es-ES" noProof="1"/>
+          </a:p>
+        </p:txBody>
+      </p:sp>
+      <p:pic>
+        <p:nvPicPr>
+          <p:cNvPr id="3075" name="Picture 3"/>
+          <p:cNvPicPr>
+            <a:picLocks noChangeAspect="1" noChangeArrowheads="1"/>
+          </p:cNvPicPr>
+          <p:nvPr/>
+        </p:nvPicPr>
+        <p:blipFill>
+          <a:blip r:embed="rId4" cstate="print">
+            <a:extLst>
+              <a:ext uri="{28A0092B-C50C-407E-A947-70E740481C1C}">
+                <a14:useLocalDpi xmlns:a14="http://schemas.microsoft.com/office/drawing/2010/main" val="0"/>
+              </a:ext>
+            </a:extLst>
+          </a:blip>
+          <a:srcRect/>
+          <a:stretch>
+            <a:fillRect/>
+          </a:stretch>
+        </p:blipFill>
+        <p:spPr bwMode="auto">
+          <a:xfrm>
+            <a:off x="319519" y="2743201"/>
+            <a:ext cx="5661726" cy="3367088"/>
+          </a:xfrm>
+          <a:prstGeom prst="rect">
+            <a:avLst/>
+          </a:prstGeom>
+          <a:noFill/>
+          <a:ln>
+            <a:noFill/>
+          </a:ln>
+          <a:effectLst/>
+          <a:extLst>
+            <a:ext uri="{909E8E84-426E-40DD-AFC4-6F175D3DCCD1}">
+              <a14:hiddenFill xmlns:a14="http://schemas.microsoft.com/office/drawing/2010/main">
+                <a:solidFill>
+                  <a:schemeClr val="accent1"/>
+                </a:solidFill>
+              </a14:hiddenFill>
+            </a:ext>
+            <a:ext uri="{91240B29-F687-4F45-9708-019B960494DF}">
+              <a14:hiddenLine xmlns:a14="http://schemas.microsoft.com/office/drawing/2010/main" w="9525">
+                <a:solidFill>
+                  <a:schemeClr val="tx1"/>
+                </a:solidFill>
+                <a:miter lim="800000"/>
+                <a:headEnd/>
+                <a:tailEnd/>
+              </a14:hiddenLine>
+            </a:ext>
+            <a:ext uri="{AF507438-7753-43E0-B8FC-AC1667EBCBE1}">
+              <a14:hiddenEffects xmlns:a14="http://schemas.microsoft.com/office/drawing/2010/main">
+                <a:effectLst>
+                  <a:outerShdw dist="35921" dir="2700000" algn="ctr" rotWithShape="0">
+                    <a:schemeClr val="bg2"/>
+                  </a:outerShdw>
+                </a:effectLst>
+              </a14:hiddenEffects>
+            </a:ext>
+          </a:extLst>
+        </p:spPr>
+      </p:pic>
+      <p:sp>
+        <p:nvSpPr>
+          <p:cNvPr id="11" name="TextBox 10"/>
+          <p:cNvSpPr txBox="1"/>
+          <p:nvPr/>
+        </p:nvSpPr>
+        <p:spPr>
+          <a:xfrm>
+            <a:off x="384979" y="2321607"/>
+            <a:ext cx="5466271" cy="369332"/>
+          </a:xfrm>
+          <a:prstGeom prst="rect">
+            <a:avLst/>
+          </a:prstGeom>
+          <a:noFill/>
+        </p:spPr>
+        <p:txBody>
+          <a:bodyPr wrap="square" rtlCol="0">
+            <a:spAutoFit/>
+          </a:bodyPr>
+          <a:lstStyle/>
+          <a:p>
+            <a:pPr algn="ctr"/>
+            <a:r>
+              <a:rPr lang="es-ES" noProof="1" smtClean="0"/>
+              <a:t>Inner rib</a:t>
+            </a:r>
+            <a:endParaRPr lang="es-ES" noProof="1"/>
+          </a:p>
+        </p:txBody>
+      </p:sp>
+    </p:spTree>
+    <p:extLst>
+      <p:ext uri="{BB962C8B-B14F-4D97-AF65-F5344CB8AC3E}">
+        <p14:creationId xmlns:p14="http://schemas.microsoft.com/office/powerpoint/2010/main" val="2068983696"/>
+      </p:ext>
+    </p:extLst>
+  </p:cSld>
+  <p:clrMapOvr>
+    <a:masterClrMapping/>
+  </p:clrMapOvr>
+  <p:transition>
+    <p:fade/>
+  </p:transition>
+</p:sld>
+</file>
+
+<file path=ppt/slides/slide5.xml><?xml version="1.0" encoding="utf-8"?>
+<p:sld xmlns:a="http://schemas.openxmlformats.org/drawingml/2006/main" xmlns:r="http://schemas.openxmlformats.org/officeDocument/2006/relationships" xmlns:p="http://schemas.openxmlformats.org/presentationml/2006/main">
+  <p:cSld>
+    <p:spTree>
+      <p:nvGrpSpPr>
+        <p:cNvPr id="1" name=""/>
+        <p:cNvGrpSpPr/>
+        <p:nvPr/>
+      </p:nvGrpSpPr>
+      <p:grpSpPr>
+        <a:xfrm>
+          <a:off x="0" y="0"/>
+          <a:ext cx="0" cy="0"/>
+          <a:chOff x="0" y="0"/>
+          <a:chExt cx="0" cy="0"/>
+        </a:xfrm>
+      </p:grpSpPr>
+      <p:sp>
+        <p:nvSpPr>
+          <p:cNvPr id="3" name="Datumsplatzhalter 2"/>
+          <p:cNvSpPr>
+            <a:spLocks noGrp="1"/>
+          </p:cNvSpPr>
+          <p:nvPr>
+            <p:ph type="dt" sz="half" idx="10"/>
+          </p:nvPr>
+        </p:nvSpPr>
+        <p:spPr/>
+        <p:txBody>
+          <a:bodyPr/>
+          <a:lstStyle/>
+          <a:p>
+            <a:fld id="{3B2F6CB8-9391-4BED-909F-C47A979AE1C4}" type="datetime1">
+              <a:rPr lang="de-DE" smtClean="0"/>
+              <a:t>19.07.2017</a:t>
+            </a:fld>
+            <a:endParaRPr lang="de-DE"/>
+          </a:p>
+        </p:txBody>
+      </p:sp>
+      <p:sp>
+        <p:nvSpPr>
+          <p:cNvPr id="4" name="Fußzeilenplatzhalter 3"/>
+          <p:cNvSpPr>
+            <a:spLocks noGrp="1"/>
+          </p:cNvSpPr>
+          <p:nvPr>
+            <p:ph type="ftr" sz="quarter" idx="11"/>
+          </p:nvPr>
+        </p:nvSpPr>
+        <p:spPr/>
+        <p:txBody>
+          <a:bodyPr/>
+          <a:lstStyle/>
+          <a:p>
+            <a:r>
+              <a:rPr lang="de-DE" dirty="0"/>
+              <a:t>Valverde, Alejandro</a:t>
+            </a:r>
+          </a:p>
+        </p:txBody>
+      </p:sp>
+      <p:sp>
+        <p:nvSpPr>
+          <p:cNvPr id="5" name="Foliennummernplatzhalter 4"/>
+          <p:cNvSpPr>
+            <a:spLocks noGrp="1"/>
+          </p:cNvSpPr>
+          <p:nvPr>
+            <p:ph type="sldNum" sz="quarter" idx="12"/>
+          </p:nvPr>
+        </p:nvSpPr>
+        <p:spPr/>
+        <p:txBody>
+          <a:bodyPr/>
+          <a:lstStyle/>
+          <a:p>
+            <a:fld id="{6C6AE60A-B69C-4790-82F7-3882EDF23186}" type="slidenum">
+              <a:rPr lang="de-DE" smtClean="0"/>
+              <a:t>5</a:t>
+            </a:fld>
+            <a:endParaRPr lang="de-DE"/>
+          </a:p>
+        </p:txBody>
+      </p:sp>
+      <p:sp>
+        <p:nvSpPr>
+          <p:cNvPr id="6" name="Titel 5"/>
+          <p:cNvSpPr>
+            <a:spLocks noGrp="1"/>
+          </p:cNvSpPr>
+          <p:nvPr>
+            <p:ph type="title"/>
+          </p:nvPr>
+        </p:nvSpPr>
+        <p:spPr>
+          <a:xfrm>
+            <a:off x="431632" y="620714"/>
+            <a:ext cx="11323975" cy="450205"/>
+          </a:xfrm>
+        </p:spPr>
+        <p:txBody>
+          <a:bodyPr anchor="t"/>
+          <a:lstStyle/>
+          <a:p>
+            <a:r>
+              <a:rPr lang="de-CH" dirty="0" smtClean="0"/>
+              <a:t>Abaqus model – Buckling characteristics</a:t>
+            </a:r>
+            <a:endParaRPr lang="de-CH" dirty="0"/>
+          </a:p>
+        </p:txBody>
+      </p:sp>
+      <p:sp>
+        <p:nvSpPr>
+          <p:cNvPr id="7" name="TextBox 6"/>
+          <p:cNvSpPr txBox="1"/>
+          <p:nvPr/>
+        </p:nvSpPr>
+        <p:spPr>
+          <a:xfrm>
+            <a:off x="529088" y="1398277"/>
+            <a:ext cx="5178056" cy="923330"/>
+          </a:xfrm>
+          <a:prstGeom prst="rect">
+            <a:avLst/>
+          </a:prstGeom>
+          <a:noFill/>
+        </p:spPr>
+        <p:txBody>
+          <a:bodyPr wrap="square" rtlCol="0">
+            <a:spAutoFit/>
+          </a:bodyPr>
+          <a:lstStyle/>
+          <a:p>
+            <a:r>
+              <a:rPr lang="es-ES" noProof="1" smtClean="0"/>
+              <a:t>Charactistics:</a:t>
+            </a:r>
+          </a:p>
+          <a:p>
+            <a:pPr marL="742950" lvl="1" indent="-285750">
+              <a:buFont typeface="Arial" pitchFamily="34" charset="0"/>
+              <a:buChar char="•"/>
+            </a:pPr>
+            <a:r>
+              <a:rPr lang="es-ES" noProof="1" smtClean="0"/>
+              <a:t>At root</a:t>
+            </a:r>
+          </a:p>
+          <a:p>
+            <a:pPr marL="742950" lvl="1" indent="-285750">
+              <a:buFont typeface="Arial" pitchFamily="34" charset="0"/>
+              <a:buChar char="•"/>
+            </a:pPr>
+            <a:r>
+              <a:rPr lang="es-ES" noProof="1" smtClean="0"/>
+              <a:t>It’s the main cause of lack of convergence</a:t>
+            </a:r>
+            <a:endParaRPr lang="es-ES" noProof="1"/>
+          </a:p>
+        </p:txBody>
+      </p:sp>
+      <p:pic>
+        <p:nvPicPr>
+          <p:cNvPr id="3074" name="Picture 2"/>
+          <p:cNvPicPr>
+            <a:picLocks noChangeAspect="1" noChangeArrowheads="1"/>
+          </p:cNvPicPr>
+          <p:nvPr/>
+        </p:nvPicPr>
+        <p:blipFill rotWithShape="1">
+          <a:blip r:embed="rId3" cstate="print">
+            <a:extLst>
+              <a:ext uri="{28A0092B-C50C-407E-A947-70E740481C1C}">
+                <a14:useLocalDpi xmlns:a14="http://schemas.microsoft.com/office/drawing/2010/main" val="0"/>
+              </a:ext>
+            </a:extLst>
+          </a:blip>
+          <a:srcRect l="2277" b="6502"/>
+          <a:stretch/>
+        </p:blipFill>
+        <p:spPr bwMode="auto">
+          <a:xfrm>
+            <a:off x="6031038" y="2743200"/>
+            <a:ext cx="5602870" cy="3367088"/>
+          </a:xfrm>
+          <a:prstGeom prst="rect">
+            <a:avLst/>
+          </a:prstGeom>
+          <a:noFill/>
+          <a:ln>
+            <a:noFill/>
+          </a:ln>
+          <a:effectLst/>
+          <a:extLst>
+            <a:ext uri="{909E8E84-426E-40DD-AFC4-6F175D3DCCD1}">
+              <a14:hiddenFill xmlns:a14="http://schemas.microsoft.com/office/drawing/2010/main">
+                <a:solidFill>
+                  <a:schemeClr val="accent1"/>
+                </a:solidFill>
+              </a14:hiddenFill>
+            </a:ext>
+            <a:ext uri="{91240B29-F687-4F45-9708-019B960494DF}">
+              <a14:hiddenLine xmlns:a14="http://schemas.microsoft.com/office/drawing/2010/main" w="9525">
+                <a:solidFill>
+                  <a:schemeClr val="tx1"/>
+                </a:solidFill>
+                <a:miter lim="800000"/>
+                <a:headEnd/>
+                <a:tailEnd/>
+              </a14:hiddenLine>
+            </a:ext>
+            <a:ext uri="{AF507438-7753-43E0-B8FC-AC1667EBCBE1}">
+              <a14:hiddenEffects xmlns:a14="http://schemas.microsoft.com/office/drawing/2010/main">
+                <a:effectLst>
+                  <a:outerShdw dist="35921" dir="2700000" algn="ctr" rotWithShape="0">
+                    <a:schemeClr val="bg2"/>
+                  </a:outerShdw>
+                </a:effectLst>
+              </a14:hiddenEffects>
+            </a:ext>
+          </a:extLst>
+        </p:spPr>
+      </p:pic>
+      <p:sp>
+        <p:nvSpPr>
+          <p:cNvPr id="9" name="TextBox 8"/>
+          <p:cNvSpPr txBox="1"/>
+          <p:nvPr/>
+        </p:nvSpPr>
+        <p:spPr>
+          <a:xfrm>
+            <a:off x="6031038" y="2267098"/>
+            <a:ext cx="5466271" cy="369332"/>
+          </a:xfrm>
+          <a:prstGeom prst="rect">
+            <a:avLst/>
+          </a:prstGeom>
+          <a:noFill/>
+        </p:spPr>
+        <p:txBody>
+          <a:bodyPr wrap="square" rtlCol="0">
+            <a:spAutoFit/>
+          </a:bodyPr>
+          <a:lstStyle/>
+          <a:p>
+            <a:pPr algn="ctr"/>
+            <a:r>
+              <a:rPr lang="es-ES" noProof="1" smtClean="0"/>
+              <a:t>No inner ribs</a:t>
+            </a:r>
+            <a:endParaRPr lang="es-ES" noProof="1"/>
+          </a:p>
+        </p:txBody>
+      </p:sp>
+      <p:pic>
+        <p:nvPicPr>
+          <p:cNvPr id="3075" name="Picture 3"/>
+          <p:cNvPicPr>
+            <a:picLocks noChangeAspect="1" noChangeArrowheads="1"/>
+          </p:cNvPicPr>
+          <p:nvPr/>
+        </p:nvPicPr>
+        <p:blipFill>
+          <a:blip r:embed="rId4" cstate="print">
+            <a:extLst>
+              <a:ext uri="{28A0092B-C50C-407E-A947-70E740481C1C}">
+                <a14:useLocalDpi xmlns:a14="http://schemas.microsoft.com/office/drawing/2010/main" val="0"/>
+              </a:ext>
+            </a:extLst>
+          </a:blip>
+          <a:srcRect/>
+          <a:stretch>
+            <a:fillRect/>
+          </a:stretch>
+        </p:blipFill>
+        <p:spPr bwMode="auto">
+          <a:xfrm>
+            <a:off x="319519" y="2743201"/>
+            <a:ext cx="5661726" cy="3367088"/>
+          </a:xfrm>
+          <a:prstGeom prst="rect">
+            <a:avLst/>
+          </a:prstGeom>
+          <a:noFill/>
+          <a:ln>
+            <a:noFill/>
+          </a:ln>
+          <a:effectLst/>
+          <a:extLst>
+            <a:ext uri="{909E8E84-426E-40DD-AFC4-6F175D3DCCD1}">
+              <a14:hiddenFill xmlns:a14="http://schemas.microsoft.com/office/drawing/2010/main">
+                <a:solidFill>
+                  <a:schemeClr val="accent1"/>
+                </a:solidFill>
+              </a14:hiddenFill>
+            </a:ext>
+            <a:ext uri="{91240B29-F687-4F45-9708-019B960494DF}">
+              <a14:hiddenLine xmlns:a14="http://schemas.microsoft.com/office/drawing/2010/main" w="9525">
+                <a:solidFill>
+                  <a:schemeClr val="tx1"/>
+                </a:solidFill>
+                <a:miter lim="800000"/>
+                <a:headEnd/>
+                <a:tailEnd/>
+              </a14:hiddenLine>
+            </a:ext>
+            <a:ext uri="{AF507438-7753-43E0-B8FC-AC1667EBCBE1}">
+              <a14:hiddenEffects xmlns:a14="http://schemas.microsoft.com/office/drawing/2010/main">
+                <a:effectLst>
+                  <a:outerShdw dist="35921" dir="2700000" algn="ctr" rotWithShape="0">
+                    <a:schemeClr val="bg2"/>
+                  </a:outerShdw>
+                </a:effectLst>
+              </a14:hiddenEffects>
+            </a:ext>
+          </a:extLst>
+        </p:spPr>
+      </p:pic>
+      <p:sp>
+        <p:nvSpPr>
+          <p:cNvPr id="11" name="TextBox 10"/>
+          <p:cNvSpPr txBox="1"/>
+          <p:nvPr/>
+        </p:nvSpPr>
+        <p:spPr>
+          <a:xfrm>
+            <a:off x="384979" y="2321607"/>
+            <a:ext cx="5466271" cy="369332"/>
+          </a:xfrm>
+          <a:prstGeom prst="rect">
+            <a:avLst/>
+          </a:prstGeom>
+          <a:noFill/>
+        </p:spPr>
+        <p:txBody>
+          <a:bodyPr wrap="square" rtlCol="0">
+            <a:spAutoFit/>
+          </a:bodyPr>
+          <a:lstStyle/>
+          <a:p>
+            <a:pPr algn="ctr"/>
+            <a:r>
+              <a:rPr lang="es-ES" noProof="1" smtClean="0"/>
+              <a:t>Inner rib</a:t>
+            </a:r>
+            <a:endParaRPr lang="es-ES" noProof="1"/>
+          </a:p>
+        </p:txBody>
+      </p:sp>
+    </p:spTree>
+    <p:extLst>
+      <p:ext uri="{BB962C8B-B14F-4D97-AF65-F5344CB8AC3E}">
+        <p14:creationId xmlns:p14="http://schemas.microsoft.com/office/powerpoint/2010/main" val="3063326756"/>
+      </p:ext>
+    </p:extLst>
+  </p:cSld>
+  <p:clrMapOvr>
+    <a:masterClrMapping/>
+  </p:clrMapOvr>
+  <p:transition>
+    <p:fade/>
+  </p:transition>
+</p:sld>
+</file>
+
+<file path=ppt/slides/slide6.xml><?xml version="1.0" encoding="utf-8"?>
+<p:sld xmlns:a="http://schemas.openxmlformats.org/drawingml/2006/main" xmlns:r="http://schemas.openxmlformats.org/officeDocument/2006/relationships" xmlns:p="http://schemas.openxmlformats.org/presentationml/2006/main">
+  <p:cSld>
+    <p:spTree>
+      <p:nvGrpSpPr>
+        <p:cNvPr id="1" name=""/>
+        <p:cNvGrpSpPr/>
+        <p:nvPr/>
+      </p:nvGrpSpPr>
+      <p:grpSpPr>
+        <a:xfrm>
+          <a:off x="0" y="0"/>
+          <a:ext cx="0" cy="0"/>
+          <a:chOff x="0" y="0"/>
+          <a:chExt cx="0" cy="0"/>
+        </a:xfrm>
+      </p:grpSpPr>
+      <p:sp>
+        <p:nvSpPr>
+          <p:cNvPr id="3" name="Datumsplatzhalter 2"/>
+          <p:cNvSpPr>
+            <a:spLocks noGrp="1"/>
+          </p:cNvSpPr>
+          <p:nvPr>
+            <p:ph type="dt" sz="half" idx="10"/>
+          </p:nvPr>
+        </p:nvSpPr>
+        <p:spPr/>
+        <p:txBody>
+          <a:bodyPr/>
+          <a:lstStyle/>
+          <a:p>
+            <a:fld id="{3B2F6CB8-9391-4BED-909F-C47A979AE1C4}" type="datetime1">
+              <a:rPr lang="de-DE" smtClean="0"/>
+              <a:t>19.07.2017</a:t>
+            </a:fld>
+            <a:endParaRPr lang="de-DE"/>
+          </a:p>
+        </p:txBody>
+      </p:sp>
+      <p:sp>
+        <p:nvSpPr>
+          <p:cNvPr id="4" name="Fußzeilenplatzhalter 3"/>
+          <p:cNvSpPr>
+            <a:spLocks noGrp="1"/>
+          </p:cNvSpPr>
+          <p:nvPr>
+            <p:ph type="ftr" sz="quarter" idx="11"/>
+          </p:nvPr>
+        </p:nvSpPr>
+        <p:spPr/>
+        <p:txBody>
+          <a:bodyPr/>
+          <a:lstStyle/>
+          <a:p>
+            <a:r>
+              <a:rPr lang="de-DE" dirty="0"/>
+              <a:t>Valverde, Alejandro</a:t>
+            </a:r>
+          </a:p>
+        </p:txBody>
+      </p:sp>
+      <p:sp>
+        <p:nvSpPr>
+          <p:cNvPr id="5" name="Foliennummernplatzhalter 4"/>
+          <p:cNvSpPr>
+            <a:spLocks noGrp="1"/>
+          </p:cNvSpPr>
+          <p:nvPr>
+            <p:ph type="sldNum" sz="quarter" idx="12"/>
+          </p:nvPr>
+        </p:nvSpPr>
+        <p:spPr/>
+        <p:txBody>
+          <a:bodyPr/>
+          <a:lstStyle/>
+          <a:p>
+            <a:fld id="{6C6AE60A-B69C-4790-82F7-3882EDF23186}" type="slidenum">
+              <a:rPr lang="de-DE" smtClean="0"/>
+              <a:t>6</a:t>
+            </a:fld>
+            <a:endParaRPr lang="de-DE"/>
+          </a:p>
+        </p:txBody>
+      </p:sp>
+      <p:sp>
+        <p:nvSpPr>
+          <p:cNvPr id="6" name="Titel 5"/>
+          <p:cNvSpPr>
+            <a:spLocks noGrp="1"/>
+          </p:cNvSpPr>
+          <p:nvPr>
+            <p:ph type="title"/>
+          </p:nvPr>
+        </p:nvSpPr>
+        <p:spPr>
+          <a:xfrm>
+            <a:off x="431632" y="620714"/>
+            <a:ext cx="11323975" cy="450205"/>
+          </a:xfrm>
+        </p:spPr>
+        <p:txBody>
+          <a:bodyPr anchor="t"/>
+          <a:lstStyle/>
+          <a:p>
+            <a:r>
+              <a:rPr lang="de-CH" dirty="0" smtClean="0"/>
+              <a:t>Next steps</a:t>
+            </a:r>
+            <a:endParaRPr lang="de-CH" dirty="0"/>
+          </a:p>
+        </p:txBody>
+      </p:sp>
+      <p:sp>
+        <p:nvSpPr>
+          <p:cNvPr id="7" name="TextBox 6"/>
+          <p:cNvSpPr txBox="1"/>
+          <p:nvPr/>
+        </p:nvSpPr>
+        <p:spPr>
+          <a:xfrm>
+            <a:off x="529087" y="1398278"/>
+            <a:ext cx="11226519" cy="3970318"/>
+          </a:xfrm>
+          <a:prstGeom prst="rect">
+            <a:avLst/>
+          </a:prstGeom>
+          <a:noFill/>
+        </p:spPr>
+        <p:txBody>
+          <a:bodyPr wrap="square" rtlCol="0">
+            <a:spAutoFit/>
+          </a:bodyPr>
+          <a:lstStyle/>
+          <a:p>
+            <a:r>
+              <a:rPr lang="es-ES" noProof="1" smtClean="0"/>
+              <a:t>Anaytical model:</a:t>
+            </a:r>
+            <a:endParaRPr lang="es-ES" noProof="1" smtClean="0"/>
+          </a:p>
+          <a:p>
+            <a:pPr marL="742950" lvl="1" indent="-285750">
+              <a:buFont typeface="Arial" pitchFamily="34" charset="0"/>
+              <a:buChar char="•"/>
+            </a:pPr>
+            <a:r>
+              <a:rPr lang="es-ES" noProof="1" smtClean="0"/>
+              <a:t>Finish writing the first part</a:t>
+            </a:r>
+          </a:p>
+          <a:p>
+            <a:pPr marL="742950" lvl="1" indent="-285750">
+              <a:buFont typeface="Arial" pitchFamily="34" charset="0"/>
+              <a:buChar char="•"/>
+            </a:pPr>
+            <a:r>
+              <a:rPr lang="es-ES" noProof="1" smtClean="0"/>
+              <a:t>Complete FEM vs Analytical verification with Gilles</a:t>
+            </a:r>
+          </a:p>
+          <a:p>
+            <a:pPr marL="742950" lvl="1" indent="-285750">
+              <a:buFont typeface="Arial" pitchFamily="34" charset="0"/>
+              <a:buChar char="•"/>
+            </a:pPr>
+            <a:endParaRPr lang="es-ES" noProof="1"/>
+          </a:p>
+          <a:p>
+            <a:r>
+              <a:rPr lang="es-ES" noProof="1" smtClean="0"/>
+              <a:t>Nonlinear simulations</a:t>
+            </a:r>
+          </a:p>
+          <a:p>
+            <a:pPr marL="742950" lvl="1" indent="-285750">
+              <a:buFont typeface="Arial" pitchFamily="34" charset="0"/>
+              <a:buChar char="•"/>
+            </a:pPr>
+            <a:r>
+              <a:rPr lang="es-ES" noProof="1" smtClean="0"/>
+              <a:t>Linear vs nonlinear verification</a:t>
+            </a:r>
+          </a:p>
+          <a:p>
+            <a:pPr marL="742950" lvl="1" indent="-285750">
+              <a:buFont typeface="Arial" pitchFamily="34" charset="0"/>
+              <a:buChar char="•"/>
+            </a:pPr>
+            <a:r>
+              <a:rPr lang="es-ES" noProof="1" smtClean="0"/>
+              <a:t>Parametric study</a:t>
+            </a:r>
+          </a:p>
+          <a:p>
+            <a:pPr marL="1200150" lvl="2" indent="-285750">
+              <a:buFont typeface="Arial" pitchFamily="34" charset="0"/>
+              <a:buChar char="•"/>
+            </a:pPr>
+            <a:r>
+              <a:rPr lang="es-ES" noProof="1" smtClean="0"/>
+              <a:t>Chiral thickness, N cells, M cells</a:t>
+            </a:r>
+          </a:p>
+          <a:p>
+            <a:pPr marL="1200150" lvl="2" indent="-285750">
+              <a:buFont typeface="Arial" pitchFamily="34" charset="0"/>
+              <a:buChar char="•"/>
+            </a:pPr>
+            <a:r>
+              <a:rPr lang="es-ES" noProof="1" smtClean="0"/>
+              <a:t>How to deal with lack of convergence?</a:t>
+            </a:r>
+          </a:p>
+          <a:p>
+            <a:pPr marL="1200150" lvl="2" indent="-285750">
+              <a:buFont typeface="Arial" pitchFamily="34" charset="0"/>
+              <a:buChar char="•"/>
+            </a:pPr>
+            <a:endParaRPr lang="es-ES" noProof="1"/>
+          </a:p>
+          <a:p>
+            <a:r>
+              <a:rPr lang="es-ES" noProof="1" smtClean="0"/>
+              <a:t>Wing model</a:t>
+            </a:r>
+          </a:p>
+          <a:p>
+            <a:pPr marL="742950" lvl="1" indent="-285750">
+              <a:buFont typeface="Arial" pitchFamily="34" charset="0"/>
+              <a:buChar char="•"/>
+            </a:pPr>
+            <a:r>
+              <a:rPr lang="es-ES" noProof="1" smtClean="0"/>
+              <a:t>Embed wing and box</a:t>
+            </a:r>
+          </a:p>
+          <a:p>
+            <a:pPr marL="742950" lvl="1" indent="-285750">
+              <a:buFont typeface="Arial" pitchFamily="34" charset="0"/>
+              <a:buChar char="•"/>
+            </a:pPr>
+            <a:r>
+              <a:rPr lang="es-ES" noProof="1" smtClean="0"/>
+              <a:t>Run simulations</a:t>
+            </a:r>
+          </a:p>
+          <a:p>
+            <a:pPr marL="285750" indent="-285750">
+              <a:buFont typeface="Arial" pitchFamily="34" charset="0"/>
+              <a:buChar char="•"/>
+            </a:pPr>
+            <a:endParaRPr lang="es-ES" noProof="1"/>
+          </a:p>
+        </p:txBody>
+      </p:sp>
+    </p:spTree>
+    <p:extLst>
+      <p:ext uri="{BB962C8B-B14F-4D97-AF65-F5344CB8AC3E}">
+        <p14:creationId xmlns:p14="http://schemas.microsoft.com/office/powerpoint/2010/main" val="2816862624"/>
       </p:ext>
     </p:extLst>
   </p:cSld>
@@ -4833,7 +6468,7 @@
   <a:extraClrSchemeLst/>
   <a:extLst>
     <a:ext uri="{05A4C25C-085E-4340-85A3-A5531E510DB2}">
-      <thm15:themeFamily xmlns:thm15="http://schemas.microsoft.com/office/thememl/2012/main" xmlns="" name="CMASLab_presentation_16to9.potx" id="{E09B677F-EB88-43D1-9FDF-5AE613838345}" vid="{A9B9777C-6ED4-4A0E-9272-9194233257AE}"/>
+      <thm15:themeFamily xmlns="" xmlns:thm15="http://schemas.microsoft.com/office/thememl/2012/main" name="CMASLab_presentation_16to9.potx" id="{E09B677F-EB88-43D1-9FDF-5AE613838345}" vid="{A9B9777C-6ED4-4A0E-9272-9194233257AE}"/>
     </a:ext>
   </a:extLst>
 </a:theme>

</xml_diff>